<commit_message>
move labs into aws-ec2-lab powerpoint
</commit_message>
<xml_diff>
--- a/aws-ec2/aws-ec2-lab.pptx
+++ b/aws-ec2/aws-ec2-lab.pptx
@@ -5,16 +5,18 @@
     <p:sldMasterId id="2147483677" r:id="rId1"/>
   </p:sldMasterIdLst>
   <p:notesMasterIdLst>
-    <p:notesMasterId r:id="rId9"/>
+    <p:notesMasterId r:id="rId11"/>
   </p:notesMasterIdLst>
   <p:sldIdLst>
     <p:sldId id="256" r:id="rId2"/>
-    <p:sldId id="280" r:id="rId3"/>
-    <p:sldId id="281" r:id="rId4"/>
-    <p:sldId id="282" r:id="rId5"/>
-    <p:sldId id="283" r:id="rId6"/>
-    <p:sldId id="284" r:id="rId7"/>
-    <p:sldId id="286" r:id="rId8"/>
+    <p:sldId id="287" r:id="rId3"/>
+    <p:sldId id="288" r:id="rId4"/>
+    <p:sldId id="280" r:id="rId5"/>
+    <p:sldId id="281" r:id="rId6"/>
+    <p:sldId id="282" r:id="rId7"/>
+    <p:sldId id="283" r:id="rId8"/>
+    <p:sldId id="284" r:id="rId9"/>
+    <p:sldId id="286" r:id="rId10"/>
   </p:sldIdLst>
   <p:sldSz cx="9144000" cy="6858000" type="screen4x3"/>
   <p:notesSz cx="6858000" cy="9144000"/>
@@ -214,7 +216,7 @@
           <a:p>
             <a:fld id="{1B6676A5-1300-B945-98B1-DD92DDC3A3CB}" type="datetimeFigureOut">
               <a:rPr lang="en-US" smtClean="0"/>
-              <a:t>11/22/15</a:t>
+              <a:t>12/1/15</a:t>
             </a:fld>
             <a:endParaRPr lang="en-US"/>
           </a:p>
@@ -556,7 +558,7 @@
     </p:spTree>
     <p:extLst>
       <p:ext uri="{BB962C8B-B14F-4D97-AF65-F5344CB8AC3E}">
-        <p14:creationId xmlns:p14="http://schemas.microsoft.com/office/powerpoint/2010/main" val="83661456"/>
+        <p14:creationId xmlns:p14="http://schemas.microsoft.com/office/powerpoint/2010/main" val="1803286769"/>
       </p:ext>
     </p:extLst>
   </p:cSld>
@@ -610,6 +612,34 @@
           <a:bodyPr/>
           <a:lstStyle/>
           <a:p>
+            <a:r>
+              <a:rPr lang="en-US" dirty="0" smtClean="0"/>
+              <a:t>The</a:t>
+            </a:r>
+            <a:r>
+              <a:rPr lang="en-US" baseline="0" dirty="0" smtClean="0"/>
+              <a:t> project will accomplish the following objectives:</a:t>
+            </a:r>
+          </a:p>
+          <a:p>
+            <a:pPr marL="228600" indent="-228600">
+              <a:buFont typeface="+mj-lt"/>
+              <a:buAutoNum type="arabicPeriod"/>
+            </a:pPr>
+            <a:r>
+              <a:rPr lang="en-US" baseline="0" dirty="0" smtClean="0"/>
+              <a:t>Utilize both IP addressing and Security Group Reference when creating a Security Group</a:t>
+            </a:r>
+          </a:p>
+          <a:p>
+            <a:pPr marL="228600" indent="-228600">
+              <a:buFont typeface="+mj-lt"/>
+              <a:buAutoNum type="arabicPeriod"/>
+            </a:pPr>
+            <a:r>
+              <a:rPr lang="en-US" baseline="0" dirty="0" smtClean="0"/>
+              <a:t>Reference another Security Group within a Security Group’s Rules</a:t>
+            </a:r>
             <a:endParaRPr lang="en-US" dirty="0"/>
           </a:p>
         </p:txBody>
@@ -640,7 +670,7 @@
     </p:spTree>
     <p:extLst>
       <p:ext uri="{BB962C8B-B14F-4D97-AF65-F5344CB8AC3E}">
-        <p14:creationId xmlns:p14="http://schemas.microsoft.com/office/powerpoint/2010/main" val="494559740"/>
+        <p14:creationId xmlns:p14="http://schemas.microsoft.com/office/powerpoint/2010/main" val="2109036737"/>
       </p:ext>
     </p:extLst>
   </p:cSld>
@@ -724,7 +754,7 @@
     </p:spTree>
     <p:extLst>
       <p:ext uri="{BB962C8B-B14F-4D97-AF65-F5344CB8AC3E}">
-        <p14:creationId xmlns:p14="http://schemas.microsoft.com/office/powerpoint/2010/main" val="494559740"/>
+        <p14:creationId xmlns:p14="http://schemas.microsoft.com/office/powerpoint/2010/main" val="83661456"/>
       </p:ext>
     </p:extLst>
   </p:cSld>
@@ -862,38 +892,6 @@
           <a:bodyPr/>
           <a:lstStyle/>
           <a:p>
-            <a:r>
-              <a:rPr lang="en-US" dirty="0" smtClean="0"/>
-              <a:t>Important:</a:t>
-            </a:r>
-          </a:p>
-          <a:p>
-            <a:pPr marL="171450" indent="-171450">
-              <a:buFont typeface="Arial"/>
-              <a:buChar char="•"/>
-            </a:pPr>
-            <a:r>
-              <a:rPr lang="en-US" dirty="0" smtClean="0"/>
-              <a:t>We</a:t>
-            </a:r>
-            <a:r>
-              <a:rPr lang="en-US" baseline="0" dirty="0" smtClean="0"/>
-              <a:t> use an Internal IP Address, otherwise the Security Group would require that we allow in the Public IP Address of the gateway Server</a:t>
-            </a:r>
-          </a:p>
-          <a:p>
-            <a:pPr marL="171450" indent="-171450">
-              <a:buFont typeface="Arial"/>
-              <a:buChar char="•"/>
-            </a:pPr>
-            <a:r>
-              <a:rPr lang="en-US" dirty="0" smtClean="0"/>
-              <a:t>We use a Public IP Address</a:t>
-            </a:r>
-            <a:r>
-              <a:rPr lang="en-US" baseline="0" dirty="0" smtClean="0"/>
-              <a:t> for the www instance to allow access to apt Repository</a:t>
-            </a:r>
             <a:endParaRPr lang="en-US" dirty="0"/>
           </a:p>
         </p:txBody>
@@ -1000,6 +998,206 @@
             <a:fld id="{BFB43062-714D-1146-A97F-0D45BD9E7BF0}" type="slidenum">
               <a:rPr lang="en-US" smtClean="0"/>
               <a:t>7</a:t>
+            </a:fld>
+            <a:endParaRPr lang="en-US"/>
+          </a:p>
+        </p:txBody>
+      </p:sp>
+    </p:spTree>
+    <p:extLst>
+      <p:ext uri="{BB962C8B-B14F-4D97-AF65-F5344CB8AC3E}">
+        <p14:creationId xmlns:p14="http://schemas.microsoft.com/office/powerpoint/2010/main" val="494559740"/>
+      </p:ext>
+    </p:extLst>
+  </p:cSld>
+  <p:clrMapOvr>
+    <a:masterClrMapping/>
+  </p:clrMapOvr>
+</p:notes>
+</file>
+
+<file path=ppt/notesSlides/notesSlide7.xml><?xml version="1.0" encoding="utf-8"?>
+<p:notes xmlns:a="http://schemas.openxmlformats.org/drawingml/2006/main" xmlns:r="http://schemas.openxmlformats.org/officeDocument/2006/relationships" xmlns:p="http://schemas.openxmlformats.org/presentationml/2006/main">
+  <p:cSld>
+    <p:spTree>
+      <p:nvGrpSpPr>
+        <p:cNvPr id="1" name=""/>
+        <p:cNvGrpSpPr/>
+        <p:nvPr/>
+      </p:nvGrpSpPr>
+      <p:grpSpPr>
+        <a:xfrm>
+          <a:off x="0" y="0"/>
+          <a:ext cx="0" cy="0"/>
+          <a:chOff x="0" y="0"/>
+          <a:chExt cx="0" cy="0"/>
+        </a:xfrm>
+      </p:grpSpPr>
+      <p:sp>
+        <p:nvSpPr>
+          <p:cNvPr id="2" name="Slide Image Placeholder 1"/>
+          <p:cNvSpPr>
+            <a:spLocks noGrp="1" noRot="1" noChangeAspect="1"/>
+          </p:cNvSpPr>
+          <p:nvPr>
+            <p:ph type="sldImg"/>
+          </p:nvPr>
+        </p:nvSpPr>
+        <p:spPr/>
+      </p:sp>
+      <p:sp>
+        <p:nvSpPr>
+          <p:cNvPr id="3" name="Notes Placeholder 2"/>
+          <p:cNvSpPr>
+            <a:spLocks noGrp="1"/>
+          </p:cNvSpPr>
+          <p:nvPr>
+            <p:ph type="body" idx="1"/>
+          </p:nvPr>
+        </p:nvSpPr>
+        <p:spPr/>
+        <p:txBody>
+          <a:bodyPr/>
+          <a:lstStyle/>
+          <a:p>
+            <a:r>
+              <a:rPr lang="en-US" dirty="0" smtClean="0"/>
+              <a:t>Important:</a:t>
+            </a:r>
+          </a:p>
+          <a:p>
+            <a:pPr marL="171450" indent="-171450">
+              <a:buFont typeface="Arial"/>
+              <a:buChar char="•"/>
+            </a:pPr>
+            <a:r>
+              <a:rPr lang="en-US" dirty="0" smtClean="0"/>
+              <a:t>We</a:t>
+            </a:r>
+            <a:r>
+              <a:rPr lang="en-US" baseline="0" dirty="0" smtClean="0"/>
+              <a:t> use an Internal IP Address, otherwise the Security Group would require that we allow in the Public IP Address of the gateway Server</a:t>
+            </a:r>
+          </a:p>
+          <a:p>
+            <a:pPr marL="171450" indent="-171450">
+              <a:buFont typeface="Arial"/>
+              <a:buChar char="•"/>
+            </a:pPr>
+            <a:r>
+              <a:rPr lang="en-US" dirty="0" smtClean="0"/>
+              <a:t>We use a Public IP Address</a:t>
+            </a:r>
+            <a:r>
+              <a:rPr lang="en-US" baseline="0" dirty="0" smtClean="0"/>
+              <a:t> for the www instance to allow access to apt Repository</a:t>
+            </a:r>
+            <a:endParaRPr lang="en-US" dirty="0"/>
+          </a:p>
+        </p:txBody>
+      </p:sp>
+      <p:sp>
+        <p:nvSpPr>
+          <p:cNvPr id="4" name="Slide Number Placeholder 3"/>
+          <p:cNvSpPr>
+            <a:spLocks noGrp="1"/>
+          </p:cNvSpPr>
+          <p:nvPr>
+            <p:ph type="sldNum" sz="quarter" idx="10"/>
+          </p:nvPr>
+        </p:nvSpPr>
+        <p:spPr/>
+        <p:txBody>
+          <a:bodyPr/>
+          <a:lstStyle/>
+          <a:p>
+            <a:fld id="{BFB43062-714D-1146-A97F-0D45BD9E7BF0}" type="slidenum">
+              <a:rPr lang="en-US" smtClean="0"/>
+              <a:t>8</a:t>
+            </a:fld>
+            <a:endParaRPr lang="en-US"/>
+          </a:p>
+        </p:txBody>
+      </p:sp>
+    </p:spTree>
+    <p:extLst>
+      <p:ext uri="{BB962C8B-B14F-4D97-AF65-F5344CB8AC3E}">
+        <p14:creationId xmlns:p14="http://schemas.microsoft.com/office/powerpoint/2010/main" val="494559740"/>
+      </p:ext>
+    </p:extLst>
+  </p:cSld>
+  <p:clrMapOvr>
+    <a:masterClrMapping/>
+  </p:clrMapOvr>
+</p:notes>
+</file>
+
+<file path=ppt/notesSlides/notesSlide8.xml><?xml version="1.0" encoding="utf-8"?>
+<p:notes xmlns:a="http://schemas.openxmlformats.org/drawingml/2006/main" xmlns:r="http://schemas.openxmlformats.org/officeDocument/2006/relationships" xmlns:p="http://schemas.openxmlformats.org/presentationml/2006/main">
+  <p:cSld>
+    <p:spTree>
+      <p:nvGrpSpPr>
+        <p:cNvPr id="1" name=""/>
+        <p:cNvGrpSpPr/>
+        <p:nvPr/>
+      </p:nvGrpSpPr>
+      <p:grpSpPr>
+        <a:xfrm>
+          <a:off x="0" y="0"/>
+          <a:ext cx="0" cy="0"/>
+          <a:chOff x="0" y="0"/>
+          <a:chExt cx="0" cy="0"/>
+        </a:xfrm>
+      </p:grpSpPr>
+      <p:sp>
+        <p:nvSpPr>
+          <p:cNvPr id="2" name="Slide Image Placeholder 1"/>
+          <p:cNvSpPr>
+            <a:spLocks noGrp="1" noRot="1" noChangeAspect="1"/>
+          </p:cNvSpPr>
+          <p:nvPr>
+            <p:ph type="sldImg"/>
+          </p:nvPr>
+        </p:nvSpPr>
+        <p:spPr/>
+      </p:sp>
+      <p:sp>
+        <p:nvSpPr>
+          <p:cNvPr id="3" name="Notes Placeholder 2"/>
+          <p:cNvSpPr>
+            <a:spLocks noGrp="1"/>
+          </p:cNvSpPr>
+          <p:nvPr>
+            <p:ph type="body" idx="1"/>
+          </p:nvPr>
+        </p:nvSpPr>
+        <p:spPr/>
+        <p:txBody>
+          <a:bodyPr/>
+          <a:lstStyle/>
+          <a:p>
+            <a:endParaRPr lang="en-US" dirty="0"/>
+          </a:p>
+        </p:txBody>
+      </p:sp>
+      <p:sp>
+        <p:nvSpPr>
+          <p:cNvPr id="4" name="Slide Number Placeholder 3"/>
+          <p:cNvSpPr>
+            <a:spLocks noGrp="1"/>
+          </p:cNvSpPr>
+          <p:nvPr>
+            <p:ph type="sldNum" sz="quarter" idx="10"/>
+          </p:nvPr>
+        </p:nvSpPr>
+        <p:spPr/>
+        <p:txBody>
+          <a:bodyPr/>
+          <a:lstStyle/>
+          <a:p>
+            <a:fld id="{BFB43062-714D-1146-A97F-0D45BD9E7BF0}" type="slidenum">
+              <a:rPr lang="en-US" smtClean="0"/>
+              <a:t>9</a:t>
             </a:fld>
             <a:endParaRPr lang="en-US"/>
           </a:p>
@@ -2830,7 +3028,7 @@
           <a:p>
             <a:fld id="{7CE38E4D-051A-41E1-86A4-E56916468FD0}" type="datetimeFigureOut">
               <a:rPr lang="en-US" smtClean="0"/>
-              <a:t>11/22/15</a:t>
+              <a:t>12/1/15</a:t>
             </a:fld>
             <a:endParaRPr lang="en-US"/>
           </a:p>
@@ -3011,7 +3209,7 @@
           <a:p>
             <a:fld id="{7CE38E4D-051A-41E1-86A4-E56916468FD0}" type="datetimeFigureOut">
               <a:rPr lang="en-US" smtClean="0"/>
-              <a:t>11/22/15</a:t>
+              <a:t>12/1/15</a:t>
             </a:fld>
             <a:endParaRPr lang="en-US"/>
           </a:p>
@@ -3162,7 +3360,7 @@
           <a:p>
             <a:fld id="{7CE38E4D-051A-41E1-86A4-E56916468FD0}" type="datetimeFigureOut">
               <a:rPr lang="en-US" smtClean="0"/>
-              <a:t>11/22/15</a:t>
+              <a:t>12/1/15</a:t>
             </a:fld>
             <a:endParaRPr lang="en-US"/>
           </a:p>
@@ -4988,7 +5186,7 @@
           <a:p>
             <a:fld id="{7CE38E4D-051A-41E1-86A4-E56916468FD0}" type="datetimeFigureOut">
               <a:rPr lang="en-US" smtClean="0"/>
-              <a:t>11/22/15</a:t>
+              <a:t>12/1/15</a:t>
             </a:fld>
             <a:endParaRPr lang="en-US"/>
           </a:p>
@@ -6858,7 +7056,7 @@
           <a:p>
             <a:fld id="{7CE38E4D-051A-41E1-86A4-E56916468FD0}" type="datetimeFigureOut">
               <a:rPr lang="en-US" smtClean="0"/>
-              <a:t>11/22/15</a:t>
+              <a:t>12/1/15</a:t>
             </a:fld>
             <a:endParaRPr lang="en-US"/>
           </a:p>
@@ -6971,7 +7169,7 @@
           <a:p>
             <a:fld id="{7CE38E4D-051A-41E1-86A4-E56916468FD0}" type="datetimeFigureOut">
               <a:rPr lang="en-US" smtClean="0"/>
-              <a:t>11/22/15</a:t>
+              <a:t>12/1/15</a:t>
             </a:fld>
             <a:endParaRPr lang="en-US"/>
           </a:p>
@@ -7512,7 +7710,7 @@
           <a:p>
             <a:fld id="{7CE38E4D-051A-41E1-86A4-E56916468FD0}" type="datetimeFigureOut">
               <a:rPr lang="en-US" smtClean="0"/>
-              <a:t>11/22/15</a:t>
+              <a:t>12/1/15</a:t>
             </a:fld>
             <a:endParaRPr lang="en-US"/>
           </a:p>
@@ -7625,7 +7823,7 @@
           <a:p>
             <a:fld id="{7CE38E4D-051A-41E1-86A4-E56916468FD0}" type="datetimeFigureOut">
               <a:rPr lang="en-US" smtClean="0"/>
-              <a:t>11/22/15</a:t>
+              <a:t>12/1/15</a:t>
             </a:fld>
             <a:endParaRPr lang="en-US"/>
           </a:p>
@@ -9336,7 +9534,7 @@
           <a:p>
             <a:fld id="{7CE38E4D-051A-41E1-86A4-E56916468FD0}" type="datetimeFigureOut">
               <a:rPr lang="en-US" smtClean="0"/>
-              <a:t>11/22/15</a:t>
+              <a:t>12/1/15</a:t>
             </a:fld>
             <a:endParaRPr lang="en-US"/>
           </a:p>
@@ -9487,7 +9685,7 @@
           <a:p>
             <a:fld id="{7CE38E4D-051A-41E1-86A4-E56916468FD0}" type="datetimeFigureOut">
               <a:rPr lang="en-US" smtClean="0"/>
-              <a:t>11/22/15</a:t>
+              <a:t>12/1/15</a:t>
             </a:fld>
             <a:endParaRPr lang="en-US"/>
           </a:p>
@@ -13102,7 +13300,7 @@
           <a:p>
             <a:fld id="{7CE38E4D-051A-41E1-86A4-E56916468FD0}" type="datetimeFigureOut">
               <a:rPr lang="en-US" smtClean="0"/>
-              <a:t>11/22/15</a:t>
+              <a:t>12/1/15</a:t>
             </a:fld>
             <a:endParaRPr lang="en-US"/>
           </a:p>
@@ -14961,7 +15159,7 @@
           <a:p>
             <a:fld id="{7CE38E4D-051A-41E1-86A4-E56916468FD0}" type="datetimeFigureOut">
               <a:rPr lang="en-US" smtClean="0"/>
-              <a:t>11/22/15</a:t>
+              <a:t>12/1/15</a:t>
             </a:fld>
             <a:endParaRPr lang="en-US"/>
           </a:p>
@@ -15494,11 +15692,7 @@
           <a:p>
             <a:r>
               <a:rPr lang="en-US" dirty="0" smtClean="0"/>
-              <a:t>EC2 and Security </a:t>
-            </a:r>
-            <a:r>
-              <a:rPr lang="en-US" dirty="0" smtClean="0"/>
-              <a:t>Groups – Lab</a:t>
+              <a:t>EC2 and Security Groups – Lab</a:t>
             </a:r>
             <a:endParaRPr lang="en-US" dirty="0"/>
           </a:p>
@@ -15572,6 +15766,177 @@
       </p:grpSpPr>
       <p:sp>
         <p:nvSpPr>
+          <p:cNvPr id="3" name="Content Placeholder 2"/>
+          <p:cNvSpPr>
+            <a:spLocks noGrp="1"/>
+          </p:cNvSpPr>
+          <p:nvPr>
+            <p:ph idx="1"/>
+          </p:nvPr>
+        </p:nvSpPr>
+        <p:spPr/>
+        <p:txBody>
+          <a:bodyPr>
+            <a:normAutofit/>
+          </a:bodyPr>
+          <a:lstStyle/>
+          <a:p>
+            <a:pPr marL="0" indent="0">
+              <a:buNone/>
+            </a:pPr>
+            <a:r>
+              <a:rPr lang="en-US" dirty="0" smtClean="0"/>
+              <a:t>Create Three Groups:</a:t>
+            </a:r>
+          </a:p>
+          <a:p>
+            <a:r>
+              <a:rPr lang="en-US" dirty="0" smtClean="0"/>
+              <a:t>gateway-</a:t>
+            </a:r>
+            <a:r>
+              <a:rPr lang="en-US" dirty="0" err="1" smtClean="0"/>
+              <a:t>yourname</a:t>
+            </a:r>
+            <a:endParaRPr lang="en-US" dirty="0"/>
+          </a:p>
+          <a:p>
+            <a:pPr lvl="1"/>
+            <a:r>
+              <a:rPr lang="en-US" dirty="0" smtClean="0"/>
+              <a:t>Inbound, </a:t>
+            </a:r>
+            <a:r>
+              <a:rPr lang="en-US" dirty="0" err="1" smtClean="0"/>
+              <a:t>tcp</a:t>
+            </a:r>
+            <a:r>
+              <a:rPr lang="en-US" dirty="0" smtClean="0"/>
+              <a:t> port 22 from 0.0.0.0/0</a:t>
+            </a:r>
+          </a:p>
+          <a:p>
+            <a:r>
+              <a:rPr lang="en-US" dirty="0" smtClean="0"/>
+              <a:t>Base</a:t>
+            </a:r>
+          </a:p>
+          <a:p>
+            <a:pPr lvl="1"/>
+            <a:r>
+              <a:rPr lang="en-US" dirty="0" smtClean="0"/>
+              <a:t>Inbound, </a:t>
+            </a:r>
+            <a:r>
+              <a:rPr lang="en-US" dirty="0" err="1" smtClean="0"/>
+              <a:t>tcp</a:t>
+            </a:r>
+            <a:r>
+              <a:rPr lang="en-US" dirty="0" smtClean="0"/>
+              <a:t> port 22 from gateway-</a:t>
+            </a:r>
+            <a:r>
+              <a:rPr lang="en-US" dirty="0" err="1" smtClean="0"/>
+              <a:t>yourname</a:t>
+            </a:r>
+            <a:endParaRPr lang="en-US" dirty="0" smtClean="0"/>
+          </a:p>
+          <a:p>
+            <a:r>
+              <a:rPr lang="en-US" dirty="0" smtClean="0"/>
+              <a:t>www-</a:t>
+            </a:r>
+            <a:r>
+              <a:rPr lang="en-US" dirty="0" err="1" smtClean="0"/>
+              <a:t>yourname</a:t>
+            </a:r>
+            <a:endParaRPr lang="en-US" dirty="0" smtClean="0"/>
+          </a:p>
+          <a:p>
+            <a:pPr lvl="1"/>
+            <a:r>
+              <a:rPr lang="en-US" dirty="0" smtClean="0"/>
+              <a:t>Inbound, </a:t>
+            </a:r>
+            <a:r>
+              <a:rPr lang="en-US" dirty="0" err="1" smtClean="0"/>
+              <a:t>tcp</a:t>
+            </a:r>
+            <a:r>
+              <a:rPr lang="en-US" dirty="0" smtClean="0"/>
+              <a:t> port 80 from 0.0.0.0/0</a:t>
+            </a:r>
+          </a:p>
+        </p:txBody>
+      </p:sp>
+      <p:sp>
+        <p:nvSpPr>
+          <p:cNvPr id="2" name="Title 1"/>
+          <p:cNvSpPr>
+            <a:spLocks noGrp="1"/>
+          </p:cNvSpPr>
+          <p:nvPr>
+            <p:ph type="title"/>
+          </p:nvPr>
+        </p:nvSpPr>
+        <p:spPr/>
+        <p:txBody>
+          <a:bodyPr>
+            <a:normAutofit/>
+          </a:bodyPr>
+          <a:lstStyle/>
+          <a:p>
+            <a:r>
+              <a:rPr lang="en-US" dirty="0" smtClean="0"/>
+              <a:t>Lab: </a:t>
+            </a:r>
+            <a:r>
+              <a:rPr lang="en-US" dirty="0" smtClean="0"/>
+              <a:t>Create Security Groups</a:t>
+            </a:r>
+            <a:endParaRPr lang="en-US" dirty="0"/>
+          </a:p>
+        </p:txBody>
+      </p:sp>
+    </p:spTree>
+    <p:extLst>
+      <p:ext uri="{BB962C8B-B14F-4D97-AF65-F5344CB8AC3E}">
+        <p14:creationId xmlns:p14="http://schemas.microsoft.com/office/powerpoint/2010/main" val="2057638630"/>
+      </p:ext>
+    </p:extLst>
+  </p:cSld>
+  <p:clrMapOvr>
+    <a:masterClrMapping/>
+  </p:clrMapOvr>
+  <p:timing>
+    <p:tnLst>
+      <p:par>
+        <p:cTn id="1" dur="indefinite" restart="never" nodeType="tmRoot"/>
+      </p:par>
+    </p:tnLst>
+  </p:timing>
+</p:sld>
+</file>
+
+<file path=ppt/slides/slide3.xml><?xml version="1.0" encoding="utf-8"?>
+<p:sld xmlns:a="http://schemas.openxmlformats.org/drawingml/2006/main" xmlns:r="http://schemas.openxmlformats.org/officeDocument/2006/relationships" xmlns:p="http://schemas.openxmlformats.org/presentationml/2006/main">
+  <p:cSld>
+    <p:spTree>
+      <p:nvGrpSpPr>
+        <p:cNvPr id="1" name=""/>
+        <p:cNvGrpSpPr/>
+        <p:nvPr/>
+      </p:nvGrpSpPr>
+      <p:grpSpPr>
+        <a:xfrm>
+          <a:off x="0" y="0"/>
+          <a:ext cx="0" cy="0"/>
+          <a:chOff x="0" y="0"/>
+          <a:chExt cx="0" cy="0"/>
+        </a:xfrm>
+      </p:grpSpPr>
+      <p:sp>
+        <p:nvSpPr>
           <p:cNvPr id="2" name="Title 1"/>
           <p:cNvSpPr>
             <a:spLocks noGrp="1"/>
@@ -15588,16 +15953,102 @@
           <a:lstStyle/>
           <a:p>
             <a:r>
+              <a:rPr lang="en-US" smtClean="0"/>
+              <a:t>Lab: </a:t>
+            </a:r>
+            <a:r>
               <a:rPr lang="en-US" dirty="0" smtClean="0"/>
-              <a:t>Lab</a:t>
-            </a:r>
+              <a:t>Security Group Diagram</a:t>
+            </a:r>
+            <a:endParaRPr lang="en-US" dirty="0"/>
+          </a:p>
+        </p:txBody>
+      </p:sp>
+      <p:pic>
+        <p:nvPicPr>
+          <p:cNvPr id="7" name="Content Placeholder 6" descr="EC2 - Project.pdf"/>
+          <p:cNvPicPr>
+            <a:picLocks noGrp="1" noChangeAspect="1"/>
+          </p:cNvPicPr>
+          <p:nvPr>
+            <p:ph idx="1"/>
+          </p:nvPr>
+        </p:nvPicPr>
+        <p:blipFill rotWithShape="1">
+          <a:blip r:embed="rId3">
+            <a:extLst>
+              <a:ext uri="{28A0092B-C50C-407E-A947-70E740481C1C}">
+                <a14:useLocalDpi xmlns:a14="http://schemas.microsoft.com/office/drawing/2010/main" val="0"/>
+              </a:ext>
+            </a:extLst>
+          </a:blip>
+          <a:srcRect l="-2656" t="263" r="1" b="-1356"/>
+          <a:stretch/>
+        </p:blipFill>
+        <p:spPr>
+          <a:xfrm>
+            <a:off x="674761" y="2440602"/>
+            <a:ext cx="7605639" cy="4266098"/>
+          </a:xfrm>
+        </p:spPr>
+      </p:pic>
+    </p:spTree>
+    <p:extLst>
+      <p:ext uri="{BB962C8B-B14F-4D97-AF65-F5344CB8AC3E}">
+        <p14:creationId xmlns:p14="http://schemas.microsoft.com/office/powerpoint/2010/main" val="404016472"/>
+      </p:ext>
+    </p:extLst>
+  </p:cSld>
+  <p:clrMapOvr>
+    <a:masterClrMapping/>
+  </p:clrMapOvr>
+  <p:timing>
+    <p:tnLst>
+      <p:par>
+        <p:cTn id="1" dur="indefinite" restart="never" nodeType="tmRoot"/>
+      </p:par>
+    </p:tnLst>
+  </p:timing>
+</p:sld>
+</file>
+
+<file path=ppt/slides/slide4.xml><?xml version="1.0" encoding="utf-8"?>
+<p:sld xmlns:a="http://schemas.openxmlformats.org/drawingml/2006/main" xmlns:r="http://schemas.openxmlformats.org/officeDocument/2006/relationships" xmlns:p="http://schemas.openxmlformats.org/presentationml/2006/main">
+  <p:cSld>
+    <p:spTree>
+      <p:nvGrpSpPr>
+        <p:cNvPr id="1" name=""/>
+        <p:cNvGrpSpPr/>
+        <p:nvPr/>
+      </p:nvGrpSpPr>
+      <p:grpSpPr>
+        <a:xfrm>
+          <a:off x="0" y="0"/>
+          <a:ext cx="0" cy="0"/>
+          <a:chOff x="0" y="0"/>
+          <a:chExt cx="0" cy="0"/>
+        </a:xfrm>
+      </p:grpSpPr>
+      <p:sp>
+        <p:nvSpPr>
+          <p:cNvPr id="2" name="Title 1"/>
+          <p:cNvSpPr>
+            <a:spLocks noGrp="1"/>
+          </p:cNvSpPr>
+          <p:nvPr>
+            <p:ph type="title"/>
+          </p:nvPr>
+        </p:nvSpPr>
+        <p:spPr/>
+        <p:txBody>
+          <a:bodyPr>
+            <a:normAutofit fontScale="90000"/>
+          </a:bodyPr>
+          <a:lstStyle/>
+          <a:p>
             <a:r>
               <a:rPr lang="en-US" dirty="0" smtClean="0"/>
-              <a:t>: </a:t>
-            </a:r>
-            <a:r>
-              <a:rPr lang="en-US" dirty="0" smtClean="0"/>
-              <a:t>Build gateway and www Servers</a:t>
+              <a:t>Lab: Build gateway and www Servers</a:t>
             </a:r>
             <a:endParaRPr lang="en-US" dirty="0"/>
           </a:p>
@@ -15651,357 +16102,6 @@
 </p:sld>
 </file>
 
-<file path=ppt/slides/slide3.xml><?xml version="1.0" encoding="utf-8"?>
-<p:sld xmlns:a="http://schemas.openxmlformats.org/drawingml/2006/main" xmlns:r="http://schemas.openxmlformats.org/officeDocument/2006/relationships" xmlns:p="http://schemas.openxmlformats.org/presentationml/2006/main">
-  <p:cSld>
-    <p:spTree>
-      <p:nvGrpSpPr>
-        <p:cNvPr id="1" name=""/>
-        <p:cNvGrpSpPr/>
-        <p:nvPr/>
-      </p:nvGrpSpPr>
-      <p:grpSpPr>
-        <a:xfrm>
-          <a:off x="0" y="0"/>
-          <a:ext cx="0" cy="0"/>
-          <a:chOff x="0" y="0"/>
-          <a:chExt cx="0" cy="0"/>
-        </a:xfrm>
-      </p:grpSpPr>
-      <p:sp>
-        <p:nvSpPr>
-          <p:cNvPr id="3" name="Content Placeholder 2"/>
-          <p:cNvSpPr>
-            <a:spLocks noGrp="1"/>
-          </p:cNvSpPr>
-          <p:nvPr>
-            <p:ph idx="1"/>
-          </p:nvPr>
-        </p:nvSpPr>
-        <p:spPr/>
-        <p:txBody>
-          <a:bodyPr>
-            <a:normAutofit/>
-          </a:bodyPr>
-          <a:lstStyle/>
-          <a:p>
-            <a:r>
-              <a:rPr lang="en-US" dirty="0" smtClean="0"/>
-              <a:t>Create EC2 Instance: “gateway-</a:t>
-            </a:r>
-            <a:r>
-              <a:rPr lang="en-US" dirty="0" err="1" smtClean="0"/>
-              <a:t>yourname</a:t>
-            </a:r>
-            <a:r>
-              <a:rPr lang="en-US" dirty="0" smtClean="0"/>
-              <a:t>”</a:t>
-            </a:r>
-          </a:p>
-          <a:p>
-            <a:pPr lvl="1"/>
-            <a:r>
-              <a:rPr lang="en-US" dirty="0" smtClean="0"/>
-              <a:t>Region: us-west-2</a:t>
-            </a:r>
-          </a:p>
-          <a:p>
-            <a:pPr lvl="1"/>
-            <a:r>
-              <a:rPr lang="en-US" dirty="0" smtClean="0"/>
-              <a:t>Select AMI: ami</a:t>
-            </a:r>
-            <a:r>
-              <a:rPr lang="en-US" dirty="0"/>
-              <a:t>-</a:t>
-            </a:r>
-            <a:r>
-              <a:rPr lang="en-US" dirty="0" smtClean="0"/>
-              <a:t>5189a661 (Ubuntu)</a:t>
-            </a:r>
-          </a:p>
-          <a:p>
-            <a:pPr lvl="1"/>
-            <a:r>
-              <a:rPr lang="en-US" dirty="0" smtClean="0"/>
-              <a:t>Instance Type: t2.micro</a:t>
-            </a:r>
-          </a:p>
-          <a:p>
-            <a:pPr lvl="1"/>
-            <a:r>
-              <a:rPr lang="en-US" dirty="0" smtClean="0"/>
-              <a:t>Auto-assign Public IP: Enable</a:t>
-            </a:r>
-          </a:p>
-          <a:p>
-            <a:pPr lvl="1"/>
-            <a:r>
-              <a:rPr lang="en-US" dirty="0" smtClean="0"/>
-              <a:t>Tenancy: Shared</a:t>
-            </a:r>
-          </a:p>
-          <a:p>
-            <a:pPr lvl="1"/>
-            <a:r>
-              <a:rPr lang="en-US" dirty="0" smtClean="0"/>
-              <a:t>Security Group(s): gateway-</a:t>
-            </a:r>
-            <a:r>
-              <a:rPr lang="en-US" dirty="0" err="1" smtClean="0"/>
-              <a:t>yourname</a:t>
-            </a:r>
-            <a:endParaRPr lang="en-US" dirty="0" smtClean="0"/>
-          </a:p>
-          <a:p>
-            <a:pPr lvl="1"/>
-            <a:r>
-              <a:rPr lang="en-US" dirty="0"/>
-              <a:t>Tag: Name=gateway</a:t>
-            </a:r>
-            <a:r>
-              <a:rPr lang="en-US" dirty="0" smtClean="0"/>
-              <a:t>-</a:t>
-            </a:r>
-            <a:r>
-              <a:rPr lang="en-US" dirty="0" err="1" smtClean="0"/>
-              <a:t>yourname</a:t>
-            </a:r>
-            <a:endParaRPr lang="en-US" dirty="0"/>
-          </a:p>
-          <a:p>
-            <a:pPr lvl="1"/>
-            <a:endParaRPr lang="en-US" dirty="0" smtClean="0"/>
-          </a:p>
-          <a:p>
-            <a:pPr marL="0" indent="0">
-              <a:buNone/>
-            </a:pPr>
-            <a:endParaRPr lang="en-US" dirty="0" smtClean="0"/>
-          </a:p>
-        </p:txBody>
-      </p:sp>
-      <p:sp>
-        <p:nvSpPr>
-          <p:cNvPr id="2" name="Title 1"/>
-          <p:cNvSpPr>
-            <a:spLocks noGrp="1"/>
-          </p:cNvSpPr>
-          <p:nvPr>
-            <p:ph type="title"/>
-          </p:nvPr>
-        </p:nvSpPr>
-        <p:spPr/>
-        <p:txBody>
-          <a:bodyPr>
-            <a:normAutofit/>
-          </a:bodyPr>
-          <a:lstStyle/>
-          <a:p>
-            <a:r>
-              <a:rPr lang="en-US" dirty="0" smtClean="0"/>
-              <a:t>Lab: </a:t>
-            </a:r>
-            <a:r>
-              <a:rPr lang="en-US" dirty="0" smtClean="0"/>
-              <a:t>Create Gateway Instance</a:t>
-            </a:r>
-            <a:endParaRPr lang="en-US" dirty="0"/>
-          </a:p>
-        </p:txBody>
-      </p:sp>
-    </p:spTree>
-    <p:extLst>
-      <p:ext uri="{BB962C8B-B14F-4D97-AF65-F5344CB8AC3E}">
-        <p14:creationId xmlns:p14="http://schemas.microsoft.com/office/powerpoint/2010/main" val="2473337472"/>
-      </p:ext>
-    </p:extLst>
-  </p:cSld>
-  <p:clrMapOvr>
-    <a:masterClrMapping/>
-  </p:clrMapOvr>
-  <p:timing>
-    <p:tnLst>
-      <p:par>
-        <p:cTn id="1" dur="indefinite" restart="never" nodeType="tmRoot"/>
-      </p:par>
-    </p:tnLst>
-  </p:timing>
-</p:sld>
-</file>
-
-<file path=ppt/slides/slide4.xml><?xml version="1.0" encoding="utf-8"?>
-<p:sld xmlns:a="http://schemas.openxmlformats.org/drawingml/2006/main" xmlns:r="http://schemas.openxmlformats.org/officeDocument/2006/relationships" xmlns:p="http://schemas.openxmlformats.org/presentationml/2006/main">
-  <p:cSld>
-    <p:spTree>
-      <p:nvGrpSpPr>
-        <p:cNvPr id="1" name=""/>
-        <p:cNvGrpSpPr/>
-        <p:nvPr/>
-      </p:nvGrpSpPr>
-      <p:grpSpPr>
-        <a:xfrm>
-          <a:off x="0" y="0"/>
-          <a:ext cx="0" cy="0"/>
-          <a:chOff x="0" y="0"/>
-          <a:chExt cx="0" cy="0"/>
-        </a:xfrm>
-      </p:grpSpPr>
-      <p:sp>
-        <p:nvSpPr>
-          <p:cNvPr id="3" name="Content Placeholder 2"/>
-          <p:cNvSpPr>
-            <a:spLocks noGrp="1"/>
-          </p:cNvSpPr>
-          <p:nvPr>
-            <p:ph idx="1"/>
-          </p:nvPr>
-        </p:nvSpPr>
-        <p:spPr/>
-        <p:txBody>
-          <a:bodyPr>
-            <a:normAutofit/>
-          </a:bodyPr>
-          <a:lstStyle/>
-          <a:p>
-            <a:r>
-              <a:rPr lang="en-US" dirty="0" smtClean="0"/>
-              <a:t>Create EC2 Instance: “www-</a:t>
-            </a:r>
-            <a:r>
-              <a:rPr lang="en-US" dirty="0" err="1" smtClean="0"/>
-              <a:t>yourname</a:t>
-            </a:r>
-            <a:r>
-              <a:rPr lang="en-US" dirty="0" smtClean="0"/>
-              <a:t>”</a:t>
-            </a:r>
-          </a:p>
-          <a:p>
-            <a:pPr lvl="1"/>
-            <a:r>
-              <a:rPr lang="en-US" dirty="0" smtClean="0"/>
-              <a:t>Region: us-west-2</a:t>
-            </a:r>
-          </a:p>
-          <a:p>
-            <a:pPr lvl="1"/>
-            <a:r>
-              <a:rPr lang="en-US" dirty="0" smtClean="0"/>
-              <a:t>Select AMI: ami</a:t>
-            </a:r>
-            <a:r>
-              <a:rPr lang="en-US" dirty="0"/>
-              <a:t>-</a:t>
-            </a:r>
-            <a:r>
-              <a:rPr lang="en-US" dirty="0" smtClean="0"/>
-              <a:t>5189a661 (Ubuntu)</a:t>
-            </a:r>
-          </a:p>
-          <a:p>
-            <a:pPr lvl="1"/>
-            <a:r>
-              <a:rPr lang="en-US" dirty="0" smtClean="0"/>
-              <a:t>Instance Type: t2.micro</a:t>
-            </a:r>
-          </a:p>
-          <a:p>
-            <a:pPr lvl="1"/>
-            <a:r>
-              <a:rPr lang="en-US" dirty="0" smtClean="0"/>
-              <a:t>Auto-assign Public IP: Enable</a:t>
-            </a:r>
-          </a:p>
-          <a:p>
-            <a:pPr lvl="1"/>
-            <a:r>
-              <a:rPr lang="en-US" dirty="0" smtClean="0"/>
-              <a:t>Tenancy: Shared</a:t>
-            </a:r>
-          </a:p>
-          <a:p>
-            <a:pPr lvl="1"/>
-            <a:r>
-              <a:rPr lang="en-US" dirty="0" smtClean="0"/>
-              <a:t>Security Group(s): web-</a:t>
-            </a:r>
-            <a:r>
-              <a:rPr lang="en-US" dirty="0" err="1" smtClean="0"/>
-              <a:t>yourname</a:t>
-            </a:r>
-            <a:r>
-              <a:rPr lang="en-US" dirty="0" smtClean="0"/>
-              <a:t>, base</a:t>
-            </a:r>
-          </a:p>
-          <a:p>
-            <a:pPr lvl="1"/>
-            <a:r>
-              <a:rPr lang="en-US" dirty="0" smtClean="0"/>
-              <a:t>Tag: Name=web-</a:t>
-            </a:r>
-            <a:r>
-              <a:rPr lang="en-US" dirty="0" err="1" smtClean="0"/>
-              <a:t>yourname</a:t>
-            </a:r>
-            <a:endParaRPr lang="en-US" dirty="0" smtClean="0"/>
-          </a:p>
-          <a:p>
-            <a:pPr marL="0" indent="0">
-              <a:buNone/>
-            </a:pPr>
-            <a:endParaRPr lang="en-US" dirty="0" smtClean="0"/>
-          </a:p>
-        </p:txBody>
-      </p:sp>
-      <p:sp>
-        <p:nvSpPr>
-          <p:cNvPr id="2" name="Title 1"/>
-          <p:cNvSpPr>
-            <a:spLocks noGrp="1"/>
-          </p:cNvSpPr>
-          <p:nvPr>
-            <p:ph type="title"/>
-          </p:nvPr>
-        </p:nvSpPr>
-        <p:spPr/>
-        <p:txBody>
-          <a:bodyPr/>
-          <a:lstStyle/>
-          <a:p>
-            <a:r>
-              <a:rPr lang="en-US" dirty="0" smtClean="0"/>
-              <a:t>Lab: </a:t>
-            </a:r>
-            <a:r>
-              <a:rPr lang="en-US" dirty="0" smtClean="0"/>
-              <a:t>Create www Instance</a:t>
-            </a:r>
-            <a:endParaRPr lang="en-US" dirty="0"/>
-          </a:p>
-        </p:txBody>
-      </p:sp>
-    </p:spTree>
-    <p:extLst>
-      <p:ext uri="{BB962C8B-B14F-4D97-AF65-F5344CB8AC3E}">
-        <p14:creationId xmlns:p14="http://schemas.microsoft.com/office/powerpoint/2010/main" val="1892507087"/>
-      </p:ext>
-    </p:extLst>
-  </p:cSld>
-  <p:clrMapOvr>
-    <a:masterClrMapping/>
-  </p:clrMapOvr>
-  <p:timing>
-    <p:tnLst>
-      <p:par>
-        <p:cTn id="1" dur="indefinite" restart="never" nodeType="tmRoot"/>
-      </p:par>
-    </p:tnLst>
-  </p:timing>
-</p:sld>
-</file>
-
 <file path=ppt/slides/slide5.xml><?xml version="1.0" encoding="utf-8"?>
 <p:sld xmlns:a="http://schemas.openxmlformats.org/drawingml/2006/main" xmlns:r="http://schemas.openxmlformats.org/officeDocument/2006/relationships" xmlns:p="http://schemas.openxmlformats.org/presentationml/2006/main">
   <p:cSld>
@@ -16038,131 +16138,97 @@
           <a:p>
             <a:r>
               <a:rPr lang="en-US" dirty="0" smtClean="0"/>
-              <a:t>Login to </a:t>
+              <a:t>Create EC2 Instance: “gateway-</a:t>
             </a:r>
             <a:r>
               <a:rPr lang="en-US" dirty="0" err="1" smtClean="0"/>
-              <a:t>ssh</a:t>
+              <a:t>yourname</a:t>
             </a:r>
             <a:r>
               <a:rPr lang="en-US" dirty="0" smtClean="0"/>
-              <a:t> Instance:</a:t>
+              <a:t>”</a:t>
             </a:r>
           </a:p>
           <a:p>
             <a:pPr lvl="1"/>
             <a:r>
+              <a:rPr lang="en-US" dirty="0" smtClean="0"/>
+              <a:t>Region: us-west-2</a:t>
+            </a:r>
+          </a:p>
+          <a:p>
+            <a:pPr lvl="1"/>
+            <a:r>
+              <a:rPr lang="en-US" dirty="0" smtClean="0"/>
+              <a:t>Select AMI: ami</a:t>
+            </a:r>
+            <a:r>
+              <a:rPr lang="en-US" dirty="0"/>
+              <a:t>-</a:t>
+            </a:r>
+            <a:r>
+              <a:rPr lang="en-US" dirty="0" smtClean="0"/>
+              <a:t>5189a661 (Ubuntu)</a:t>
+            </a:r>
+          </a:p>
+          <a:p>
+            <a:pPr lvl="1"/>
+            <a:r>
+              <a:rPr lang="en-US" dirty="0" smtClean="0"/>
+              <a:t>Instance Type: t2.micro</a:t>
+            </a:r>
+          </a:p>
+          <a:p>
+            <a:pPr lvl="1"/>
+            <a:r>
+              <a:rPr lang="en-US" dirty="0" smtClean="0"/>
+              <a:t>Auto-assign Public IP: Enable</a:t>
+            </a:r>
+          </a:p>
+          <a:p>
+            <a:pPr lvl="1"/>
+            <a:r>
+              <a:rPr lang="en-US" dirty="0" smtClean="0"/>
+              <a:t>Tenancy: Shared</a:t>
+            </a:r>
+          </a:p>
+          <a:p>
+            <a:pPr lvl="1"/>
+            <a:r>
+              <a:rPr lang="en-US" dirty="0" smtClean="0"/>
+              <a:t>Security Group(s): gateway-</a:t>
+            </a:r>
+            <a:r>
               <a:rPr lang="en-US" dirty="0" err="1" smtClean="0"/>
-              <a:t>ssh</a:t>
+              <a:t>yourname</a:t>
+            </a:r>
+            <a:endParaRPr lang="en-US" dirty="0" smtClean="0"/>
+          </a:p>
+          <a:p>
+            <a:pPr lvl="1"/>
+            <a:r>
+              <a:rPr lang="en-US" dirty="0"/>
+              <a:t>Tag: Name=gateway</a:t>
             </a:r>
             <a:r>
               <a:rPr lang="en-US" dirty="0" smtClean="0"/>
-              <a:t> –</a:t>
+              <a:t>-</a:t>
             </a:r>
             <a:r>
               <a:rPr lang="en-US" dirty="0" err="1" smtClean="0"/>
-              <a:t>i</a:t>
-            </a:r>
-            <a:r>
-              <a:rPr lang="en-US" dirty="0" smtClean="0"/>
-              <a:t> ~/path/to/</a:t>
-            </a:r>
-            <a:r>
-              <a:rPr lang="en-US" dirty="0" err="1" smtClean="0"/>
-              <a:t>keypair.pem</a:t>
-            </a:r>
-            <a:r>
-              <a:rPr lang="en-US" dirty="0" smtClean="0"/>
-              <a:t> </a:t>
-            </a:r>
-            <a:r>
-              <a:rPr lang="en-US" dirty="0" smtClean="0">
-                <a:hlinkClick r:id="rId3"/>
-              </a:rPr>
-              <a:t>ubuntu</a:t>
-            </a:r>
-            <a:r>
-              <a:rPr lang="en-US" dirty="0">
-                <a:hlinkClick r:id="rId3"/>
-              </a:rPr>
-              <a:t>@</a:t>
-            </a:r>
-            <a:r>
-              <a:rPr lang="en-US" dirty="0" smtClean="0">
-                <a:hlinkClick r:id="rId3"/>
-              </a:rPr>
-              <a:t>54.69.231.28</a:t>
-            </a:r>
-          </a:p>
-          <a:p>
-            <a:r>
-              <a:rPr lang="en-US" dirty="0" smtClean="0"/>
-              <a:t>Copy </a:t>
-            </a:r>
-            <a:r>
-              <a:rPr lang="en-US" dirty="0" err="1" smtClean="0"/>
-              <a:t>Keypair</a:t>
-            </a:r>
-            <a:r>
-              <a:rPr lang="en-US" dirty="0" smtClean="0"/>
-              <a:t> to Instance (for presentation only)</a:t>
-            </a:r>
+              <a:t>yourname</a:t>
+            </a:r>
+            <a:endParaRPr lang="en-US" dirty="0"/>
           </a:p>
           <a:p>
             <a:pPr lvl="1"/>
-            <a:r>
-              <a:rPr lang="en-US" dirty="0" err="1" smtClean="0"/>
-              <a:t>scp</a:t>
-            </a:r>
-            <a:r>
-              <a:rPr lang="en-US" dirty="0" smtClean="0"/>
-              <a:t> -</a:t>
-            </a:r>
-            <a:r>
-              <a:rPr lang="en-US" dirty="0" err="1" smtClean="0"/>
-              <a:t>i</a:t>
-            </a:r>
-            <a:r>
-              <a:rPr lang="en-US" dirty="0" smtClean="0"/>
-              <a:t> ~/path/to/</a:t>
-            </a:r>
-            <a:r>
-              <a:rPr lang="en-US" dirty="0" err="1" smtClean="0"/>
-              <a:t>keypair.pem</a:t>
-            </a:r>
-            <a:r>
-              <a:rPr lang="en-US" dirty="0" smtClean="0"/>
-              <a:t> ~/path/to/</a:t>
-            </a:r>
-            <a:r>
-              <a:rPr lang="en-US" dirty="0" err="1" smtClean="0"/>
-              <a:t>keypair.pem</a:t>
-            </a:r>
-            <a:r>
-              <a:rPr lang="en-US" dirty="0" smtClean="0"/>
-              <a:t> </a:t>
-            </a:r>
-            <a:r>
-              <a:rPr lang="en-US" dirty="0" smtClean="0">
-                <a:hlinkClick r:id="rId4"/>
-              </a:rPr>
-              <a:t>ubuntu@54.69.231.28:/home/ubuntu/</a:t>
-            </a:r>
             <a:endParaRPr lang="en-US" dirty="0" smtClean="0"/>
           </a:p>
           <a:p>
-            <a:r>
-              <a:rPr lang="en-US" dirty="0" smtClean="0"/>
-              <a:t>Or use SSH Agent Forwarding</a:t>
-            </a:r>
-            <a:endParaRPr lang="en-US" dirty="0"/>
-          </a:p>
-          <a:p>
-            <a:pPr lvl="1"/>
-            <a:r>
-              <a:rPr lang="en-US" dirty="0" smtClean="0"/>
-              <a:t>Described in command line exercises</a:t>
-            </a:r>
+            <a:pPr marL="0" indent="0">
+              <a:buNone/>
+            </a:pPr>
+            <a:endParaRPr lang="en-US" dirty="0" smtClean="0"/>
           </a:p>
         </p:txBody>
       </p:sp>
@@ -16178,16 +16244,14 @@
         </p:nvSpPr>
         <p:spPr/>
         <p:txBody>
-          <a:bodyPr/>
+          <a:bodyPr>
+            <a:normAutofit/>
+          </a:bodyPr>
           <a:lstStyle/>
           <a:p>
             <a:r>
-              <a:rPr lang="en-US" dirty="0" err="1" smtClean="0"/>
-              <a:t>ssh</a:t>
-            </a:r>
-            <a:r>
               <a:rPr lang="en-US" dirty="0" smtClean="0"/>
-              <a:t> into Gateway Instance</a:t>
+              <a:t>Lab: Create Gateway Instance</a:t>
             </a:r>
             <a:endParaRPr lang="en-US" dirty="0"/>
           </a:p>
@@ -16196,7 +16260,7 @@
     </p:spTree>
     <p:extLst>
       <p:ext uri="{BB962C8B-B14F-4D97-AF65-F5344CB8AC3E}">
-        <p14:creationId xmlns:p14="http://schemas.microsoft.com/office/powerpoint/2010/main" val="3299932239"/>
+        <p14:creationId xmlns:p14="http://schemas.microsoft.com/office/powerpoint/2010/main" val="2473337472"/>
       </p:ext>
     </p:extLst>
   </p:cSld>
@@ -16249,125 +16313,92 @@
           <a:p>
             <a:r>
               <a:rPr lang="en-US" dirty="0" smtClean="0"/>
-              <a:t>Login to gateway Instance:</a:t>
+              <a:t>Create EC2 Instance: “www-</a:t>
+            </a:r>
+            <a:r>
+              <a:rPr lang="en-US" dirty="0" err="1" smtClean="0"/>
+              <a:t>yourname</a:t>
+            </a:r>
+            <a:r>
+              <a:rPr lang="en-US" dirty="0" smtClean="0"/>
+              <a:t>”</a:t>
             </a:r>
           </a:p>
           <a:p>
             <a:pPr lvl="1"/>
             <a:r>
+              <a:rPr lang="en-US" dirty="0" smtClean="0"/>
+              <a:t>Region: us-west-2</a:t>
+            </a:r>
+          </a:p>
+          <a:p>
+            <a:pPr lvl="1"/>
+            <a:r>
+              <a:rPr lang="en-US" dirty="0" smtClean="0"/>
+              <a:t>Select AMI: ami</a:t>
+            </a:r>
+            <a:r>
+              <a:rPr lang="en-US" dirty="0"/>
+              <a:t>-</a:t>
+            </a:r>
+            <a:r>
+              <a:rPr lang="en-US" dirty="0" smtClean="0"/>
+              <a:t>5189a661 (Ubuntu)</a:t>
+            </a:r>
+          </a:p>
+          <a:p>
+            <a:pPr lvl="1"/>
+            <a:r>
+              <a:rPr lang="en-US" dirty="0" smtClean="0"/>
+              <a:t>Instance Type: t2.micro</a:t>
+            </a:r>
+          </a:p>
+          <a:p>
+            <a:pPr lvl="1"/>
+            <a:r>
+              <a:rPr lang="en-US" dirty="0" smtClean="0"/>
+              <a:t>Auto-assign Public IP: Enable</a:t>
+            </a:r>
+          </a:p>
+          <a:p>
+            <a:pPr lvl="1"/>
+            <a:r>
+              <a:rPr lang="en-US" dirty="0" smtClean="0"/>
+              <a:t>Tenancy: Shared</a:t>
+            </a:r>
+          </a:p>
+          <a:p>
+            <a:pPr lvl="1"/>
+            <a:r>
+              <a:rPr lang="en-US" dirty="0" smtClean="0"/>
+              <a:t>Security Group(s): web-</a:t>
+            </a:r>
+            <a:r>
               <a:rPr lang="en-US" dirty="0" err="1" smtClean="0"/>
-              <a:t>ssh</a:t>
+              <a:t>yourname</a:t>
             </a:r>
             <a:r>
               <a:rPr lang="en-US" dirty="0" smtClean="0"/>
-              <a:t> –</a:t>
+              <a:t>, base</a:t>
+            </a:r>
+          </a:p>
+          <a:p>
+            <a:pPr lvl="1"/>
+            <a:r>
+              <a:rPr lang="en-US" dirty="0" smtClean="0"/>
+              <a:t>Tag: Name=web-</a:t>
             </a:r>
             <a:r>
               <a:rPr lang="en-US" dirty="0" err="1" smtClean="0"/>
-              <a:t>i</a:t>
-            </a:r>
-            <a:r>
-              <a:rPr lang="en-US" dirty="0" smtClean="0"/>
-              <a:t> ~/path/to/</a:t>
-            </a:r>
-            <a:r>
-              <a:rPr lang="en-US" dirty="0" err="1" smtClean="0"/>
-              <a:t>keypair.pem</a:t>
-            </a:r>
-            <a:r>
-              <a:rPr lang="en-US" dirty="0" smtClean="0"/>
-              <a:t> </a:t>
-            </a:r>
-            <a:r>
-              <a:rPr lang="en-US" dirty="0" smtClean="0">
-                <a:hlinkClick r:id="rId3"/>
-              </a:rPr>
-              <a:t>ubuntu</a:t>
-            </a:r>
-            <a:r>
-              <a:rPr lang="en-US" dirty="0">
-                <a:hlinkClick r:id="rId3"/>
-              </a:rPr>
-              <a:t>@</a:t>
-            </a:r>
-            <a:r>
-              <a:rPr lang="en-US" dirty="0" smtClean="0">
-                <a:hlinkClick r:id="rId3"/>
-              </a:rPr>
-              <a:t>54.69.231.28</a:t>
-            </a:r>
-          </a:p>
-          <a:p>
-            <a:r>
-              <a:rPr lang="en-US" dirty="0"/>
-              <a:t>Login to </a:t>
-            </a:r>
-            <a:r>
-              <a:rPr lang="en-US" dirty="0" smtClean="0"/>
-              <a:t>www Instance, using Internal IP (from gateway):</a:t>
-            </a:r>
-          </a:p>
-          <a:p>
-            <a:pPr lvl="1"/>
-            <a:r>
-              <a:rPr lang="en-US" dirty="0" err="1"/>
-              <a:t>ssh</a:t>
-            </a:r>
-            <a:r>
-              <a:rPr lang="en-US" dirty="0"/>
-              <a:t> –</a:t>
-            </a:r>
-            <a:r>
-              <a:rPr lang="en-US" dirty="0" err="1"/>
-              <a:t>i</a:t>
-            </a:r>
-            <a:r>
-              <a:rPr lang="en-US" dirty="0"/>
-              <a:t> ~/path/to/</a:t>
-            </a:r>
-            <a:r>
-              <a:rPr lang="en-US" dirty="0" err="1"/>
-              <a:t>keypair.pem</a:t>
-            </a:r>
-            <a:r>
-              <a:rPr lang="en-US" dirty="0"/>
-              <a:t> </a:t>
-            </a:r>
-            <a:r>
-              <a:rPr lang="en-US" dirty="0">
-                <a:hlinkClick r:id="rId4"/>
-              </a:rPr>
-              <a:t>ubuntu@</a:t>
-            </a:r>
-            <a:r>
-              <a:rPr lang="en-US" dirty="0" smtClean="0">
-                <a:hlinkClick r:id="rId4"/>
-              </a:rPr>
-              <a:t>172.30.0.80</a:t>
+              <a:t>yourname</a:t>
             </a:r>
             <a:endParaRPr lang="en-US" dirty="0" smtClean="0"/>
           </a:p>
           <a:p>
-            <a:r>
-              <a:rPr lang="en-US" dirty="0" smtClean="0"/>
-              <a:t>Install webserver!</a:t>
-            </a:r>
-          </a:p>
-          <a:p>
-            <a:pPr lvl="1"/>
-            <a:r>
-              <a:rPr lang="en-US" dirty="0" err="1"/>
-              <a:t>sudo</a:t>
-            </a:r>
-            <a:r>
-              <a:rPr lang="en-US" dirty="0"/>
-              <a:t> apt-get -y install </a:t>
-            </a:r>
-            <a:r>
-              <a:rPr lang="en-US" dirty="0" smtClean="0"/>
-              <a:t>apache2</a:t>
-            </a:r>
-            <a:endParaRPr lang="en-US" dirty="0"/>
+            <a:pPr marL="0" indent="0">
+              <a:buNone/>
+            </a:pPr>
+            <a:endParaRPr lang="en-US" dirty="0" smtClean="0"/>
           </a:p>
         </p:txBody>
       </p:sp>
@@ -16387,12 +16418,8 @@
           <a:lstStyle/>
           <a:p>
             <a:r>
-              <a:rPr lang="en-US" dirty="0" err="1" smtClean="0"/>
-              <a:t>ssh</a:t>
-            </a:r>
-            <a:r>
               <a:rPr lang="en-US" dirty="0" smtClean="0"/>
-              <a:t> into www Instance</a:t>
+              <a:t>Lab: Create www Instance</a:t>
             </a:r>
             <a:endParaRPr lang="en-US" dirty="0"/>
           </a:p>
@@ -16401,7 +16428,7 @@
     </p:spTree>
     <p:extLst>
       <p:ext uri="{BB962C8B-B14F-4D97-AF65-F5344CB8AC3E}">
-        <p14:creationId xmlns:p14="http://schemas.microsoft.com/office/powerpoint/2010/main" val="479738079"/>
+        <p14:creationId xmlns:p14="http://schemas.microsoft.com/office/powerpoint/2010/main" val="1892507087"/>
       </p:ext>
     </p:extLst>
   </p:cSld>
@@ -16448,6 +16475,422 @@
         <p:spPr/>
         <p:txBody>
           <a:bodyPr>
+            <a:normAutofit/>
+          </a:bodyPr>
+          <a:lstStyle/>
+          <a:p>
+            <a:r>
+              <a:rPr lang="en-US" dirty="0" smtClean="0"/>
+              <a:t>Login to </a:t>
+            </a:r>
+            <a:r>
+              <a:rPr lang="en-US" dirty="0" err="1" smtClean="0"/>
+              <a:t>ssh</a:t>
+            </a:r>
+            <a:r>
+              <a:rPr lang="en-US" dirty="0" smtClean="0"/>
+              <a:t> Instance:</a:t>
+            </a:r>
+          </a:p>
+          <a:p>
+            <a:pPr lvl="1"/>
+            <a:r>
+              <a:rPr lang="en-US" dirty="0" err="1" smtClean="0"/>
+              <a:t>ssh</a:t>
+            </a:r>
+            <a:r>
+              <a:rPr lang="en-US" dirty="0" smtClean="0"/>
+              <a:t> –</a:t>
+            </a:r>
+            <a:r>
+              <a:rPr lang="en-US" dirty="0" err="1" smtClean="0"/>
+              <a:t>i</a:t>
+            </a:r>
+            <a:r>
+              <a:rPr lang="en-US" dirty="0" smtClean="0"/>
+              <a:t> ~/path/to/</a:t>
+            </a:r>
+            <a:r>
+              <a:rPr lang="en-US" dirty="0" err="1" smtClean="0"/>
+              <a:t>keypair.pem</a:t>
+            </a:r>
+            <a:r>
+              <a:rPr lang="en-US" dirty="0" smtClean="0"/>
+              <a:t> </a:t>
+            </a:r>
+            <a:r>
+              <a:rPr lang="en-US" dirty="0" smtClean="0">
+                <a:hlinkClick r:id="rId3"/>
+              </a:rPr>
+              <a:t>ubuntu</a:t>
+            </a:r>
+            <a:r>
+              <a:rPr lang="en-US" dirty="0">
+                <a:hlinkClick r:id="rId3"/>
+              </a:rPr>
+              <a:t>@</a:t>
+            </a:r>
+            <a:r>
+              <a:rPr lang="en-US" dirty="0" smtClean="0">
+                <a:hlinkClick r:id="rId3"/>
+              </a:rPr>
+              <a:t>54.69.231.28</a:t>
+            </a:r>
+          </a:p>
+          <a:p>
+            <a:r>
+              <a:rPr lang="en-US" dirty="0" smtClean="0"/>
+              <a:t>Copy </a:t>
+            </a:r>
+            <a:r>
+              <a:rPr lang="en-US" dirty="0" err="1" smtClean="0"/>
+              <a:t>Keypair</a:t>
+            </a:r>
+            <a:r>
+              <a:rPr lang="en-US" dirty="0" smtClean="0"/>
+              <a:t> to Instance (for presentation only)</a:t>
+            </a:r>
+          </a:p>
+          <a:p>
+            <a:pPr lvl="1"/>
+            <a:r>
+              <a:rPr lang="en-US" dirty="0" err="1" smtClean="0"/>
+              <a:t>scp</a:t>
+            </a:r>
+            <a:r>
+              <a:rPr lang="en-US" dirty="0" smtClean="0"/>
+              <a:t> -</a:t>
+            </a:r>
+            <a:r>
+              <a:rPr lang="en-US" dirty="0" err="1" smtClean="0"/>
+              <a:t>i</a:t>
+            </a:r>
+            <a:r>
+              <a:rPr lang="en-US" dirty="0" smtClean="0"/>
+              <a:t> ~/path/to/</a:t>
+            </a:r>
+            <a:r>
+              <a:rPr lang="en-US" dirty="0" err="1" smtClean="0"/>
+              <a:t>keypair.pem</a:t>
+            </a:r>
+            <a:r>
+              <a:rPr lang="en-US" dirty="0" smtClean="0"/>
+              <a:t> ~/path/to/</a:t>
+            </a:r>
+            <a:r>
+              <a:rPr lang="en-US" dirty="0" err="1" smtClean="0"/>
+              <a:t>keypair.pem</a:t>
+            </a:r>
+            <a:r>
+              <a:rPr lang="en-US" dirty="0" smtClean="0"/>
+              <a:t> </a:t>
+            </a:r>
+            <a:r>
+              <a:rPr lang="en-US" dirty="0" smtClean="0">
+                <a:hlinkClick r:id="rId4"/>
+              </a:rPr>
+              <a:t>ubuntu@54.69.231.28:/home/ubuntu/</a:t>
+            </a:r>
+            <a:endParaRPr lang="en-US" dirty="0" smtClean="0"/>
+          </a:p>
+          <a:p>
+            <a:r>
+              <a:rPr lang="en-US" dirty="0" smtClean="0"/>
+              <a:t>Or use SSH Agent Forwarding</a:t>
+            </a:r>
+            <a:endParaRPr lang="en-US" dirty="0"/>
+          </a:p>
+          <a:p>
+            <a:pPr lvl="1"/>
+            <a:r>
+              <a:rPr lang="en-US" dirty="0" smtClean="0"/>
+              <a:t>Described in command line exercises</a:t>
+            </a:r>
+          </a:p>
+        </p:txBody>
+      </p:sp>
+      <p:sp>
+        <p:nvSpPr>
+          <p:cNvPr id="2" name="Title 1"/>
+          <p:cNvSpPr>
+            <a:spLocks noGrp="1"/>
+          </p:cNvSpPr>
+          <p:nvPr>
+            <p:ph type="title"/>
+          </p:nvPr>
+        </p:nvSpPr>
+        <p:spPr/>
+        <p:txBody>
+          <a:bodyPr/>
+          <a:lstStyle/>
+          <a:p>
+            <a:r>
+              <a:rPr lang="en-US" dirty="0" err="1" smtClean="0"/>
+              <a:t>ssh</a:t>
+            </a:r>
+            <a:r>
+              <a:rPr lang="en-US" dirty="0" smtClean="0"/>
+              <a:t> into Gateway Instance</a:t>
+            </a:r>
+            <a:endParaRPr lang="en-US" dirty="0"/>
+          </a:p>
+        </p:txBody>
+      </p:sp>
+    </p:spTree>
+    <p:extLst>
+      <p:ext uri="{BB962C8B-B14F-4D97-AF65-F5344CB8AC3E}">
+        <p14:creationId xmlns:p14="http://schemas.microsoft.com/office/powerpoint/2010/main" val="3299932239"/>
+      </p:ext>
+    </p:extLst>
+  </p:cSld>
+  <p:clrMapOvr>
+    <a:masterClrMapping/>
+  </p:clrMapOvr>
+  <p:timing>
+    <p:tnLst>
+      <p:par>
+        <p:cTn id="1" dur="indefinite" restart="never" nodeType="tmRoot"/>
+      </p:par>
+    </p:tnLst>
+  </p:timing>
+</p:sld>
+</file>
+
+<file path=ppt/slides/slide8.xml><?xml version="1.0" encoding="utf-8"?>
+<p:sld xmlns:a="http://schemas.openxmlformats.org/drawingml/2006/main" xmlns:r="http://schemas.openxmlformats.org/officeDocument/2006/relationships" xmlns:p="http://schemas.openxmlformats.org/presentationml/2006/main">
+  <p:cSld>
+    <p:spTree>
+      <p:nvGrpSpPr>
+        <p:cNvPr id="1" name=""/>
+        <p:cNvGrpSpPr/>
+        <p:nvPr/>
+      </p:nvGrpSpPr>
+      <p:grpSpPr>
+        <a:xfrm>
+          <a:off x="0" y="0"/>
+          <a:ext cx="0" cy="0"/>
+          <a:chOff x="0" y="0"/>
+          <a:chExt cx="0" cy="0"/>
+        </a:xfrm>
+      </p:grpSpPr>
+      <p:sp>
+        <p:nvSpPr>
+          <p:cNvPr id="3" name="Content Placeholder 2"/>
+          <p:cNvSpPr>
+            <a:spLocks noGrp="1"/>
+          </p:cNvSpPr>
+          <p:nvPr>
+            <p:ph idx="1"/>
+          </p:nvPr>
+        </p:nvSpPr>
+        <p:spPr/>
+        <p:txBody>
+          <a:bodyPr>
+            <a:normAutofit/>
+          </a:bodyPr>
+          <a:lstStyle/>
+          <a:p>
+            <a:r>
+              <a:rPr lang="en-US" dirty="0" smtClean="0"/>
+              <a:t>Login to gateway Instance:</a:t>
+            </a:r>
+          </a:p>
+          <a:p>
+            <a:pPr lvl="1"/>
+            <a:r>
+              <a:rPr lang="en-US" dirty="0" err="1" smtClean="0"/>
+              <a:t>ssh</a:t>
+            </a:r>
+            <a:r>
+              <a:rPr lang="en-US" dirty="0" smtClean="0"/>
+              <a:t> –</a:t>
+            </a:r>
+            <a:r>
+              <a:rPr lang="en-US" dirty="0" err="1" smtClean="0"/>
+              <a:t>i</a:t>
+            </a:r>
+            <a:r>
+              <a:rPr lang="en-US" dirty="0" smtClean="0"/>
+              <a:t> ~/path/to/</a:t>
+            </a:r>
+            <a:r>
+              <a:rPr lang="en-US" dirty="0" err="1" smtClean="0"/>
+              <a:t>keypair.pem</a:t>
+            </a:r>
+            <a:r>
+              <a:rPr lang="en-US" dirty="0" smtClean="0"/>
+              <a:t> </a:t>
+            </a:r>
+            <a:r>
+              <a:rPr lang="en-US" dirty="0" smtClean="0">
+                <a:hlinkClick r:id="rId3"/>
+              </a:rPr>
+              <a:t>ubuntu</a:t>
+            </a:r>
+            <a:r>
+              <a:rPr lang="en-US" dirty="0">
+                <a:hlinkClick r:id="rId3"/>
+              </a:rPr>
+              <a:t>@</a:t>
+            </a:r>
+            <a:r>
+              <a:rPr lang="en-US" dirty="0" smtClean="0">
+                <a:hlinkClick r:id="rId3"/>
+              </a:rPr>
+              <a:t>54.69.231.28</a:t>
+            </a:r>
+          </a:p>
+          <a:p>
+            <a:r>
+              <a:rPr lang="en-US" dirty="0"/>
+              <a:t>Login to </a:t>
+            </a:r>
+            <a:r>
+              <a:rPr lang="en-US" dirty="0" smtClean="0"/>
+              <a:t>www Instance, using Internal IP (from gateway):</a:t>
+            </a:r>
+          </a:p>
+          <a:p>
+            <a:pPr lvl="1"/>
+            <a:r>
+              <a:rPr lang="en-US" dirty="0" err="1"/>
+              <a:t>ssh</a:t>
+            </a:r>
+            <a:r>
+              <a:rPr lang="en-US" dirty="0"/>
+              <a:t> –</a:t>
+            </a:r>
+            <a:r>
+              <a:rPr lang="en-US" dirty="0" err="1"/>
+              <a:t>i</a:t>
+            </a:r>
+            <a:r>
+              <a:rPr lang="en-US" dirty="0"/>
+              <a:t> ~/path/to/</a:t>
+            </a:r>
+            <a:r>
+              <a:rPr lang="en-US" dirty="0" err="1"/>
+              <a:t>keypair.pem</a:t>
+            </a:r>
+            <a:r>
+              <a:rPr lang="en-US" dirty="0"/>
+              <a:t> </a:t>
+            </a:r>
+            <a:r>
+              <a:rPr lang="en-US" dirty="0">
+                <a:hlinkClick r:id="rId4"/>
+              </a:rPr>
+              <a:t>ubuntu@</a:t>
+            </a:r>
+            <a:r>
+              <a:rPr lang="en-US" dirty="0" smtClean="0">
+                <a:hlinkClick r:id="rId4"/>
+              </a:rPr>
+              <a:t>172.30.0.80</a:t>
+            </a:r>
+            <a:endParaRPr lang="en-US" dirty="0" smtClean="0"/>
+          </a:p>
+          <a:p>
+            <a:r>
+              <a:rPr lang="en-US" dirty="0" smtClean="0"/>
+              <a:t>Install webserver!</a:t>
+            </a:r>
+          </a:p>
+          <a:p>
+            <a:pPr lvl="1"/>
+            <a:r>
+              <a:rPr lang="en-US" dirty="0" err="1"/>
+              <a:t>sudo</a:t>
+            </a:r>
+            <a:r>
+              <a:rPr lang="en-US" dirty="0"/>
+              <a:t> apt-get -y install </a:t>
+            </a:r>
+            <a:r>
+              <a:rPr lang="en-US" dirty="0" smtClean="0"/>
+              <a:t>apache2</a:t>
+            </a:r>
+            <a:endParaRPr lang="en-US" dirty="0"/>
+          </a:p>
+        </p:txBody>
+      </p:sp>
+      <p:sp>
+        <p:nvSpPr>
+          <p:cNvPr id="2" name="Title 1"/>
+          <p:cNvSpPr>
+            <a:spLocks noGrp="1"/>
+          </p:cNvSpPr>
+          <p:nvPr>
+            <p:ph type="title"/>
+          </p:nvPr>
+        </p:nvSpPr>
+        <p:spPr/>
+        <p:txBody>
+          <a:bodyPr/>
+          <a:lstStyle/>
+          <a:p>
+            <a:r>
+              <a:rPr lang="en-US" dirty="0" err="1" smtClean="0"/>
+              <a:t>ssh</a:t>
+            </a:r>
+            <a:r>
+              <a:rPr lang="en-US" dirty="0" smtClean="0"/>
+              <a:t> into www Instance</a:t>
+            </a:r>
+            <a:endParaRPr lang="en-US" dirty="0"/>
+          </a:p>
+        </p:txBody>
+      </p:sp>
+    </p:spTree>
+    <p:extLst>
+      <p:ext uri="{BB962C8B-B14F-4D97-AF65-F5344CB8AC3E}">
+        <p14:creationId xmlns:p14="http://schemas.microsoft.com/office/powerpoint/2010/main" val="479738079"/>
+      </p:ext>
+    </p:extLst>
+  </p:cSld>
+  <p:clrMapOvr>
+    <a:masterClrMapping/>
+  </p:clrMapOvr>
+  <p:timing>
+    <p:tnLst>
+      <p:par>
+        <p:cTn id="1" dur="indefinite" restart="never" nodeType="tmRoot"/>
+      </p:par>
+    </p:tnLst>
+  </p:timing>
+</p:sld>
+</file>
+
+<file path=ppt/slides/slide9.xml><?xml version="1.0" encoding="utf-8"?>
+<p:sld xmlns:a="http://schemas.openxmlformats.org/drawingml/2006/main" xmlns:r="http://schemas.openxmlformats.org/officeDocument/2006/relationships" xmlns:p="http://schemas.openxmlformats.org/presentationml/2006/main">
+  <p:cSld>
+    <p:spTree>
+      <p:nvGrpSpPr>
+        <p:cNvPr id="1" name=""/>
+        <p:cNvGrpSpPr/>
+        <p:nvPr/>
+      </p:nvGrpSpPr>
+      <p:grpSpPr>
+        <a:xfrm>
+          <a:off x="0" y="0"/>
+          <a:ext cx="0" cy="0"/>
+          <a:chOff x="0" y="0"/>
+          <a:chExt cx="0" cy="0"/>
+        </a:xfrm>
+      </p:grpSpPr>
+      <p:sp>
+        <p:nvSpPr>
+          <p:cNvPr id="3" name="Content Placeholder 2"/>
+          <p:cNvSpPr>
+            <a:spLocks noGrp="1"/>
+          </p:cNvSpPr>
+          <p:nvPr>
+            <p:ph idx="1"/>
+          </p:nvPr>
+        </p:nvSpPr>
+        <p:spPr/>
+        <p:txBody>
+          <a:bodyPr>
             <a:normAutofit fontScale="92500" lnSpcReduction="20000"/>
           </a:bodyPr>
           <a:lstStyle/>
@@ -16584,11 +17027,7 @@
           <a:p>
             <a:r>
               <a:rPr lang="en-US" dirty="0" smtClean="0"/>
-              <a:t>Lab: Build </a:t>
-            </a:r>
-            <a:r>
-              <a:rPr lang="en-US" dirty="0" smtClean="0"/>
-              <a:t>an EC2 Instance using user-data</a:t>
+              <a:t>Lab: Build an EC2 Instance using user-data</a:t>
             </a:r>
             <a:endParaRPr lang="en-US" dirty="0"/>
           </a:p>

</xml_diff>